<commit_message>
submit conf and share ppt
</commit_message>
<xml_diff>
--- a/share/fe-basic/html-base/前端基础分享.pptx
+++ b/share/fe-basic/html-base/前端基础分享.pptx
@@ -273,7 +273,7 @@
           <a:p>
             <a:fld id="{3AE23B63-CE3A-4A44-8CEC-A5FF0AAF4D81}" type="datetimeFigureOut">
               <a:rPr lang="zh-CN" altLang="en-US" smtClean="0"/>
-              <a:t>2016/9/9</a:t>
+              <a:t>2017/4/4</a:t>
             </a:fld>
             <a:endParaRPr lang="zh-CN" altLang="en-US"/>
           </a:p>
@@ -443,7 +443,7 @@
           <a:p>
             <a:fld id="{3AE23B63-CE3A-4A44-8CEC-A5FF0AAF4D81}" type="datetimeFigureOut">
               <a:rPr lang="zh-CN" altLang="en-US" smtClean="0"/>
-              <a:t>2016/9/9</a:t>
+              <a:t>2017/4/4</a:t>
             </a:fld>
             <a:endParaRPr lang="zh-CN" altLang="en-US"/>
           </a:p>
@@ -623,7 +623,7 @@
           <a:p>
             <a:fld id="{3AE23B63-CE3A-4A44-8CEC-A5FF0AAF4D81}" type="datetimeFigureOut">
               <a:rPr lang="zh-CN" altLang="en-US" smtClean="0"/>
-              <a:t>2016/9/9</a:t>
+              <a:t>2017/4/4</a:t>
             </a:fld>
             <a:endParaRPr lang="zh-CN" altLang="en-US"/>
           </a:p>
@@ -793,7 +793,7 @@
           <a:p>
             <a:fld id="{3AE23B63-CE3A-4A44-8CEC-A5FF0AAF4D81}" type="datetimeFigureOut">
               <a:rPr lang="zh-CN" altLang="en-US" smtClean="0"/>
-              <a:t>2016/9/9</a:t>
+              <a:t>2017/4/4</a:t>
             </a:fld>
             <a:endParaRPr lang="zh-CN" altLang="en-US"/>
           </a:p>
@@ -1039,7 +1039,7 @@
           <a:p>
             <a:fld id="{3AE23B63-CE3A-4A44-8CEC-A5FF0AAF4D81}" type="datetimeFigureOut">
               <a:rPr lang="zh-CN" altLang="en-US" smtClean="0"/>
-              <a:t>2016/9/9</a:t>
+              <a:t>2017/4/4</a:t>
             </a:fld>
             <a:endParaRPr lang="zh-CN" altLang="en-US"/>
           </a:p>
@@ -1271,7 +1271,7 @@
           <a:p>
             <a:fld id="{3AE23B63-CE3A-4A44-8CEC-A5FF0AAF4D81}" type="datetimeFigureOut">
               <a:rPr lang="zh-CN" altLang="en-US" smtClean="0"/>
-              <a:t>2016/9/9</a:t>
+              <a:t>2017/4/4</a:t>
             </a:fld>
             <a:endParaRPr lang="zh-CN" altLang="en-US"/>
           </a:p>
@@ -1638,7 +1638,7 @@
           <a:p>
             <a:fld id="{3AE23B63-CE3A-4A44-8CEC-A5FF0AAF4D81}" type="datetimeFigureOut">
               <a:rPr lang="zh-CN" altLang="en-US" smtClean="0"/>
-              <a:t>2016/9/9</a:t>
+              <a:t>2017/4/4</a:t>
             </a:fld>
             <a:endParaRPr lang="zh-CN" altLang="en-US"/>
           </a:p>
@@ -1756,7 +1756,7 @@
           <a:p>
             <a:fld id="{3AE23B63-CE3A-4A44-8CEC-A5FF0AAF4D81}" type="datetimeFigureOut">
               <a:rPr lang="zh-CN" altLang="en-US" smtClean="0"/>
-              <a:t>2016/9/9</a:t>
+              <a:t>2017/4/4</a:t>
             </a:fld>
             <a:endParaRPr lang="zh-CN" altLang="en-US"/>
           </a:p>
@@ -1851,7 +1851,7 @@
           <a:p>
             <a:fld id="{3AE23B63-CE3A-4A44-8CEC-A5FF0AAF4D81}" type="datetimeFigureOut">
               <a:rPr lang="zh-CN" altLang="en-US" smtClean="0"/>
-              <a:t>2016/9/9</a:t>
+              <a:t>2017/4/4</a:t>
             </a:fld>
             <a:endParaRPr lang="zh-CN" altLang="en-US"/>
           </a:p>
@@ -2128,7 +2128,7 @@
           <a:p>
             <a:fld id="{3AE23B63-CE3A-4A44-8CEC-A5FF0AAF4D81}" type="datetimeFigureOut">
               <a:rPr lang="zh-CN" altLang="en-US" smtClean="0"/>
-              <a:t>2016/9/9</a:t>
+              <a:t>2017/4/4</a:t>
             </a:fld>
             <a:endParaRPr lang="zh-CN" altLang="en-US"/>
           </a:p>
@@ -2381,7 +2381,7 @@
           <a:p>
             <a:fld id="{3AE23B63-CE3A-4A44-8CEC-A5FF0AAF4D81}" type="datetimeFigureOut">
               <a:rPr lang="zh-CN" altLang="en-US" smtClean="0"/>
-              <a:t>2016/9/9</a:t>
+              <a:t>2017/4/4</a:t>
             </a:fld>
             <a:endParaRPr lang="zh-CN" altLang="en-US"/>
           </a:p>
@@ -2594,7 +2594,7 @@
           <a:p>
             <a:fld id="{3AE23B63-CE3A-4A44-8CEC-A5FF0AAF4D81}" type="datetimeFigureOut">
               <a:rPr lang="zh-CN" altLang="en-US" smtClean="0"/>
-              <a:t>2016/9/9</a:t>
+              <a:t>2017/4/4</a:t>
             </a:fld>
             <a:endParaRPr lang="zh-CN" altLang="en-US"/>
           </a:p>
@@ -3122,6 +3122,13 @@
   <p:clrMapOvr>
     <a:masterClrMapping/>
   </p:clrMapOvr>
+  <p:timing>
+    <p:tnLst>
+      <p:par>
+        <p:cTn id="1" dur="indefinite" restart="never" nodeType="tmRoot"/>
+      </p:par>
+    </p:tnLst>
+  </p:timing>
 </p:sld>
 </file>
 
@@ -3797,6 +3804,13 @@
   <p:clrMapOvr>
     <a:masterClrMapping/>
   </p:clrMapOvr>
+  <p:timing>
+    <p:tnLst>
+      <p:par>
+        <p:cTn id="1" dur="indefinite" restart="never" nodeType="tmRoot"/>
+      </p:par>
+    </p:tnLst>
+  </p:timing>
 </p:sld>
 </file>
 
@@ -3851,6 +3865,13 @@
   <p:clrMapOvr>
     <a:masterClrMapping/>
   </p:clrMapOvr>
+  <p:timing>
+    <p:tnLst>
+      <p:par>
+        <p:cTn id="1" dur="indefinite" restart="never" nodeType="tmRoot"/>
+      </p:par>
+    </p:tnLst>
+  </p:timing>
 </p:sld>
 </file>
 
@@ -4026,6 +4047,13 @@
   <p:clrMapOvr>
     <a:masterClrMapping/>
   </p:clrMapOvr>
+  <p:timing>
+    <p:tnLst>
+      <p:par>
+        <p:cTn id="1" dur="indefinite" restart="never" nodeType="tmRoot"/>
+      </p:par>
+    </p:tnLst>
+  </p:timing>
 </p:sld>
 </file>
 
@@ -4134,6 +4162,13 @@
   <p:clrMapOvr>
     <a:masterClrMapping/>
   </p:clrMapOvr>
+  <p:timing>
+    <p:tnLst>
+      <p:par>
+        <p:cTn id="1" dur="indefinite" restart="never" nodeType="tmRoot"/>
+      </p:par>
+    </p:tnLst>
+  </p:timing>
 </p:sld>
 </file>
 
@@ -4502,6 +4537,13 @@
   <p:clrMapOvr>
     <a:masterClrMapping/>
   </p:clrMapOvr>
+  <p:timing>
+    <p:tnLst>
+      <p:par>
+        <p:cTn id="1" dur="indefinite" restart="never" nodeType="tmRoot"/>
+      </p:par>
+    </p:tnLst>
+  </p:timing>
 </p:sld>
 </file>
 
@@ -4638,6 +4680,13 @@
   <p:clrMapOvr>
     <a:masterClrMapping/>
   </p:clrMapOvr>
+  <p:timing>
+    <p:tnLst>
+      <p:par>
+        <p:cTn id="1" dur="indefinite" restart="never" nodeType="tmRoot"/>
+      </p:par>
+    </p:tnLst>
+  </p:timing>
 </p:sld>
 </file>
 
@@ -4692,6 +4741,13 @@
   <p:clrMapOvr>
     <a:masterClrMapping/>
   </p:clrMapOvr>
+  <p:timing>
+    <p:tnLst>
+      <p:par>
+        <p:cTn id="1" dur="indefinite" restart="never" nodeType="tmRoot"/>
+      </p:par>
+    </p:tnLst>
+  </p:timing>
 </p:sld>
 </file>
 
@@ -4847,6 +4903,13 @@
   <p:clrMapOvr>
     <a:masterClrMapping/>
   </p:clrMapOvr>
+  <p:timing>
+    <p:tnLst>
+      <p:par>
+        <p:cTn id="1" dur="indefinite" restart="never" nodeType="tmRoot"/>
+      </p:par>
+    </p:tnLst>
+  </p:timing>
 </p:sld>
 </file>
 
@@ -4978,6 +5041,13 @@
   <p:clrMapOvr>
     <a:masterClrMapping/>
   </p:clrMapOvr>
+  <p:timing>
+    <p:tnLst>
+      <p:par>
+        <p:cTn id="1" dur="indefinite" restart="never" nodeType="tmRoot"/>
+      </p:par>
+    </p:tnLst>
+  </p:timing>
 </p:sld>
 </file>
 
@@ -5118,6 +5188,13 @@
   <p:clrMapOvr>
     <a:masterClrMapping/>
   </p:clrMapOvr>
+  <p:timing>
+    <p:tnLst>
+      <p:par>
+        <p:cTn id="1" dur="indefinite" restart="never" nodeType="tmRoot"/>
+      </p:par>
+    </p:tnLst>
+  </p:timing>
 </p:sld>
 </file>
 
@@ -5206,6 +5283,13 @@
   <p:clrMapOvr>
     <a:masterClrMapping/>
   </p:clrMapOvr>
+  <p:timing>
+    <p:tnLst>
+      <p:par>
+        <p:cTn id="1" dur="indefinite" restart="never" nodeType="tmRoot"/>
+      </p:par>
+    </p:tnLst>
+  </p:timing>
 </p:sld>
 </file>
 
@@ -5293,6 +5377,13 @@
   <p:clrMapOvr>
     <a:masterClrMapping/>
   </p:clrMapOvr>
+  <p:timing>
+    <p:tnLst>
+      <p:par>
+        <p:cTn id="1" dur="indefinite" restart="never" nodeType="tmRoot"/>
+      </p:par>
+    </p:tnLst>
+  </p:timing>
 </p:sld>
 </file>
 
@@ -5460,6 +5551,13 @@
   <p:clrMapOvr>
     <a:masterClrMapping/>
   </p:clrMapOvr>
+  <p:timing>
+    <p:tnLst>
+      <p:par>
+        <p:cTn id="1" dur="indefinite" restart="never" nodeType="tmRoot"/>
+      </p:par>
+    </p:tnLst>
+  </p:timing>
 </p:sld>
 </file>
 
@@ -5565,6 +5663,13 @@
   <p:clrMapOvr>
     <a:masterClrMapping/>
   </p:clrMapOvr>
+  <p:timing>
+    <p:tnLst>
+      <p:par>
+        <p:cTn id="1" dur="indefinite" restart="never" nodeType="tmRoot"/>
+      </p:par>
+    </p:tnLst>
+  </p:timing>
 </p:sld>
 </file>
 
@@ -5776,6 +5881,13 @@
   <p:clrMapOvr>
     <a:masterClrMapping/>
   </p:clrMapOvr>
+  <p:timing>
+    <p:tnLst>
+      <p:par>
+        <p:cTn id="1" dur="indefinite" restart="never" nodeType="tmRoot"/>
+      </p:par>
+    </p:tnLst>
+  </p:timing>
 </p:sld>
 </file>
 
@@ -5904,6 +6016,13 @@
   <p:clrMapOvr>
     <a:masterClrMapping/>
   </p:clrMapOvr>
+  <p:timing>
+    <p:tnLst>
+      <p:par>
+        <p:cTn id="1" dur="indefinite" restart="never" nodeType="tmRoot"/>
+      </p:par>
+    </p:tnLst>
+  </p:timing>
 </p:sld>
 </file>
 
@@ -6027,6 +6146,13 @@
   <p:clrMapOvr>
     <a:masterClrMapping/>
   </p:clrMapOvr>
+  <p:timing>
+    <p:tnLst>
+      <p:par>
+        <p:cTn id="1" dur="indefinite" restart="never" nodeType="tmRoot"/>
+      </p:par>
+    </p:tnLst>
+  </p:timing>
 </p:sld>
 </file>
 
@@ -6891,11 +7017,7 @@
           <a:p>
             <a:r>
               <a:rPr lang="zh-CN" altLang="en-US" dirty="0" smtClean="0"/>
-              <a:t>什么是前端</a:t>
-            </a:r>
-            <a:r>
-              <a:rPr lang="zh-CN" altLang="en-US" dirty="0" smtClean="0"/>
-              <a:t>？</a:t>
+              <a:t>什么是前端？</a:t>
             </a:r>
             <a:endParaRPr lang="en-US" altLang="zh-CN" dirty="0" smtClean="0"/>
           </a:p>
@@ -6925,6 +7047,13 @@
   <p:clrMapOvr>
     <a:masterClrMapping/>
   </p:clrMapOvr>
+  <p:timing>
+    <p:tnLst>
+      <p:par>
+        <p:cTn id="1" dur="indefinite" restart="never" nodeType="tmRoot"/>
+      </p:par>
+    </p:tnLst>
+  </p:timing>
 </p:sld>
 </file>
 
@@ -7210,6 +7339,13 @@
   <p:clrMapOvr>
     <a:masterClrMapping/>
   </p:clrMapOvr>
+  <p:timing>
+    <p:tnLst>
+      <p:par>
+        <p:cTn id="1" dur="indefinite" restart="never" nodeType="tmRoot"/>
+      </p:par>
+    </p:tnLst>
+  </p:timing>
 </p:sld>
 </file>
 

</xml_diff>